<commit_message>
specs and pres tuesday
</commit_message>
<xml_diff>
--- a/documentation/Presentation/Presentation_v1.pptx
+++ b/documentation/Presentation/Presentation_v1.pptx
@@ -6770,40 +6770,30 @@
           <a:p>
             <a:r>
               <a:rPr lang="en-GB" dirty="0" smtClean="0"/>
-              <a:t>Effort estimates</a:t>
+              <a:t>Specifications:</a:t>
+            </a:r>
+            <a:r>
+              <a:rPr lang="en-GB" dirty="0" smtClean="0"/>
+              <a:t/>
             </a:r>
             <a:br>
               <a:rPr lang="en-GB" dirty="0" smtClean="0"/>
             </a:br>
             <a:r>
               <a:rPr lang="en-GB" dirty="0" smtClean="0"/>
-              <a:t>Development &amp; Testing</a:t>
-            </a:r>
-            <a:endParaRPr lang="en-GB" dirty="0"/>
-          </a:p>
-        </p:txBody>
-      </p:sp>
-      <p:sp>
-        <p:nvSpPr>
-          <p:cNvPr id="3" name="Content Placeholder 2"/>
-          <p:cNvSpPr>
-            <a:spLocks noGrp="1"/>
-          </p:cNvSpPr>
-          <p:nvPr>
-            <p:ph idx="1"/>
-          </p:nvPr>
-        </p:nvSpPr>
-        <p:spPr/>
-        <p:txBody>
-          <a:bodyPr/>
-          <a:lstStyle/>
-          <a:p>
+              <a:t>Development &amp; </a:t>
+            </a:r>
             <a:r>
               <a:rPr lang="en-GB" dirty="0" smtClean="0"/>
-              <a:t>BDD (Behaviour driven development)</a:t>
-            </a:r>
-          </a:p>
-          <a:p>
+              <a:t>Testing</a:t>
+            </a:r>
+            <a:br>
+              <a:rPr lang="en-GB" dirty="0" smtClean="0"/>
+            </a:br>
+            <a:r>
+              <a:rPr lang="en-GB" sz="2000" dirty="0" smtClean="0"/>
+              <a:t>and effort estimates</a:t>
+            </a:r>
             <a:endParaRPr lang="en-GB" dirty="0"/>
           </a:p>
         </p:txBody>
@@ -6875,7 +6865,7 @@
         </p:blipFill>
         <p:spPr>
           <a:xfrm>
-            <a:off x="381246" y="2655295"/>
+            <a:off x="365343" y="2432658"/>
             <a:ext cx="10973632" cy="3792774"/>
           </a:xfrm>
           <a:prstGeom prst="rect">

</xml_diff>